<commit_message>
update SBOL logo on SBOLv2 quickstart
</commit_message>
<xml_diff>
--- a/2018/Visual-Quickstart/SBOL Visual 2.0 Quickstart.pptx
+++ b/2018/Visual-Quickstart/SBOL Visual 2.0 Quickstart.pptx
@@ -219,7 +219,7 @@
           <a:p>
             <a:fld id="{9BCACCAD-939A-534B-BD3C-7263FE43D5A1}" type="datetimeFigureOut">
               <a:rPr lang="en-US" smtClean="0"/>
-              <a:t>1/2/18</a:t>
+              <a:t>1/3/18</a:t>
             </a:fld>
             <a:endParaRPr lang="en-US"/>
           </a:p>
@@ -386,7 +386,7 @@
             <a:fld id="{7D0468E1-02D2-4C4B-B9A7-6C361D2976BF}" type="datetimeFigureOut">
               <a:rPr lang="en-US" smtClean="0"/>
               <a:pPr/>
-              <a:t>1/2/18</a:t>
+              <a:t>1/3/18</a:t>
             </a:fld>
             <a:endParaRPr lang="en-US"/>
           </a:p>
@@ -1016,7 +1016,7 @@
             </a:pPr>
             <a:fld id="{7B8BCC4C-FAA7-AC45-8FD1-1A5D1E98DD25}" type="datetime1">
               <a:rPr lang="en-US" smtClean="0"/>
-              <a:t>1/2/18</a:t>
+              <a:t>1/3/18</a:t>
             </a:fld>
             <a:endParaRPr lang="en-US"/>
           </a:p>
@@ -1208,7 +1208,7 @@
             </a:pPr>
             <a:fld id="{DF9053E4-D391-D442-A148-BFA2631C1500}" type="datetime1">
               <a:rPr lang="en-US" smtClean="0"/>
-              <a:t>1/2/18</a:t>
+              <a:t>1/3/18</a:t>
             </a:fld>
             <a:endParaRPr lang="en-US"/>
           </a:p>
@@ -1411,7 +1411,7 @@
             </a:pPr>
             <a:fld id="{647B455B-CB08-CB44-94A2-E0E1AAE53D03}" type="datetime1">
               <a:rPr lang="en-US" smtClean="0"/>
-              <a:t>1/2/18</a:t>
+              <a:t>1/3/18</a:t>
             </a:fld>
             <a:endParaRPr lang="en-US"/>
           </a:p>
@@ -1604,7 +1604,7 @@
             </a:pPr>
             <a:fld id="{1BB21FFC-4F79-BF48-85DE-30A3DC22A95F}" type="datetime1">
               <a:rPr lang="en-US" smtClean="0"/>
-              <a:t>1/2/18</a:t>
+              <a:t>1/3/18</a:t>
             </a:fld>
             <a:endParaRPr lang="en-US"/>
           </a:p>
@@ -1872,7 +1872,7 @@
             </a:pPr>
             <a:fld id="{47CE67E5-02A1-DA40-A385-9A7A6F0F4A16}" type="datetime1">
               <a:rPr lang="en-US" smtClean="0"/>
-              <a:t>1/2/18</a:t>
+              <a:t>1/3/18</a:t>
             </a:fld>
             <a:endParaRPr lang="en-US"/>
           </a:p>
@@ -2183,7 +2183,7 @@
             </a:pPr>
             <a:fld id="{CC604390-33B9-5F4D-B13D-D28252CE5B94}" type="datetime1">
               <a:rPr lang="en-US" smtClean="0"/>
-              <a:t>1/2/18</a:t>
+              <a:t>1/3/18</a:t>
             </a:fld>
             <a:endParaRPr lang="en-US"/>
           </a:p>
@@ -2628,7 +2628,7 @@
             </a:pPr>
             <a:fld id="{6F44B48B-8C2F-1A47-AA18-DF9ED05E8DE2}" type="datetime1">
               <a:rPr lang="en-US" smtClean="0"/>
-              <a:t>1/2/18</a:t>
+              <a:t>1/3/18</a:t>
             </a:fld>
             <a:endParaRPr lang="en-US"/>
           </a:p>
@@ -2769,7 +2769,7 @@
             </a:pPr>
             <a:fld id="{4AFD0EE6-B95D-EA41-AF33-2A7518575B93}" type="datetime1">
               <a:rPr lang="en-US" smtClean="0"/>
-              <a:t>1/2/18</a:t>
+              <a:t>1/3/18</a:t>
             </a:fld>
             <a:endParaRPr lang="en-US"/>
           </a:p>
@@ -2887,7 +2887,7 @@
             </a:pPr>
             <a:fld id="{2EF556CF-9E9B-0C42-BCA2-D1F8E5C7FCAA}" type="datetime1">
               <a:rPr lang="en-US" smtClean="0"/>
-              <a:t>1/2/18</a:t>
+              <a:t>1/3/18</a:t>
             </a:fld>
             <a:endParaRPr lang="en-US"/>
           </a:p>
@@ -3187,7 +3187,7 @@
             </a:pPr>
             <a:fld id="{30DDBE65-6E8E-A843-92A3-1B013FB415BC}" type="datetime1">
               <a:rPr lang="en-US" smtClean="0"/>
-              <a:t>1/2/18</a:t>
+              <a:t>1/3/18</a:t>
             </a:fld>
             <a:endParaRPr lang="en-US"/>
           </a:p>
@@ -3466,7 +3466,7 @@
             </a:pPr>
             <a:fld id="{5D869E41-1228-1649-AE05-3AEEC09773E5}" type="datetime1">
               <a:rPr lang="en-US" smtClean="0"/>
-              <a:t>1/2/18</a:t>
+              <a:t>1/3/18</a:t>
             </a:fld>
             <a:endParaRPr lang="en-US"/>
           </a:p>
@@ -3717,7 +3717,7 @@
             </a:pPr>
             <a:fld id="{2AB9D791-AB10-1145-BC0D-F545658CE146}" type="datetime1">
               <a:rPr lang="en-US" smtClean="0"/>
-              <a:t>1/2/18</a:t>
+              <a:t>1/3/18</a:t>
             </a:fld>
             <a:endParaRPr lang="en-US"/>
           </a:p>
@@ -3886,7 +3886,7 @@
       </p:sp>
       <p:pic>
         <p:nvPicPr>
-          <p:cNvPr id="10" name="Picture 9"/>
+          <p:cNvPr id="11" name="Picture 10"/>
           <p:cNvPicPr>
             <a:picLocks noChangeAspect="1"/>
           </p:cNvPicPr>
@@ -3900,8 +3900,8 @@
         </p:blipFill>
         <p:spPr>
           <a:xfrm>
-            <a:off x="7298871" y="207963"/>
-            <a:ext cx="1658557" cy="588141"/>
+            <a:off x="7342556" y="168045"/>
+            <a:ext cx="1655064" cy="627783"/>
           </a:xfrm>
           <a:prstGeom prst="rect">
             <a:avLst/>
@@ -4358,11 +4358,7 @@
             <a:pPr algn="ctr"/>
             <a:r>
               <a:rPr lang="en-US" dirty="0" smtClean="0"/>
-              <a:t>Quick Introduction to</a:t>
-            </a:r>
-            <a:r>
-              <a:rPr lang="en-US" dirty="0" smtClean="0"/>
-              <a:t> </a:t>
+              <a:t>Quick Introduction to </a:t>
             </a:r>
             <a:r>
               <a:rPr lang="en-US" dirty="0"/>
@@ -4395,7 +4391,6 @@
               <a:rPr lang="en-US" dirty="0" smtClean="0"/>
               <a:t>January 2018</a:t>
             </a:r>
-            <a:endParaRPr lang="en-US" dirty="0" smtClean="0"/>
           </a:p>
         </p:txBody>
       </p:sp>
@@ -11950,15 +11945,7 @@
             <a:pPr lvl="1"/>
             <a:r>
               <a:rPr lang="en-US" dirty="0" smtClean="0"/>
-              <a:t>Many </a:t>
-            </a:r>
-            <a:r>
-              <a:rPr lang="en-US" dirty="0" smtClean="0"/>
-              <a:t>glyphs can </a:t>
-            </a:r>
-            <a:r>
-              <a:rPr lang="en-US" dirty="0" smtClean="0"/>
-              <a:t>be drawn directly</a:t>
+              <a:t>Many glyphs can be drawn directly</a:t>
             </a:r>
           </a:p>
           <a:p>

</xml_diff>

<commit_message>
SEED materials from Jake
</commit_message>
<xml_diff>
--- a/2018/Visual-Quickstart/SBOL Visual 2.0 Quickstart.pptx
+++ b/2018/Visual-Quickstart/SBOL Visual 2.0 Quickstart.pptx
@@ -219,7 +219,7 @@
           <a:p>
             <a:fld id="{9BCACCAD-939A-534B-BD3C-7263FE43D5A1}" type="datetimeFigureOut">
               <a:rPr lang="en-US" smtClean="0"/>
-              <a:t>1/3/18</a:t>
+              <a:t>4/1/18</a:t>
             </a:fld>
             <a:endParaRPr lang="en-US"/>
           </a:p>
@@ -386,7 +386,7 @@
             <a:fld id="{7D0468E1-02D2-4C4B-B9A7-6C361D2976BF}" type="datetimeFigureOut">
               <a:rPr lang="en-US" smtClean="0"/>
               <a:pPr/>
-              <a:t>1/3/18</a:t>
+              <a:t>4/1/18</a:t>
             </a:fld>
             <a:endParaRPr lang="en-US"/>
           </a:p>
@@ -452,38 +452,37 @@
           <a:p>
             <a:pPr lvl="0"/>
             <a:r>
-              <a:rPr lang="en-US" smtClean="0"/>
+              <a:rPr lang="en-US"/>
               <a:t>Click to edit Master text styles</a:t>
             </a:r>
           </a:p>
           <a:p>
             <a:pPr lvl="1"/>
             <a:r>
-              <a:rPr lang="en-US" smtClean="0"/>
+              <a:rPr lang="en-US"/>
               <a:t>Second level</a:t>
             </a:r>
           </a:p>
           <a:p>
             <a:pPr lvl="2"/>
             <a:r>
-              <a:rPr lang="en-US" smtClean="0"/>
+              <a:rPr lang="en-US"/>
               <a:t>Third level</a:t>
             </a:r>
           </a:p>
           <a:p>
             <a:pPr lvl="3"/>
             <a:r>
-              <a:rPr lang="en-US" smtClean="0"/>
+              <a:rPr lang="en-US"/>
               <a:t>Fourth level</a:t>
             </a:r>
           </a:p>
           <a:p>
             <a:pPr lvl="4"/>
             <a:r>
-              <a:rPr lang="en-US" smtClean="0"/>
+              <a:rPr lang="en-US"/>
               <a:t>Fifth level</a:t>
             </a:r>
-            <a:endParaRPr lang="en-US"/>
           </a:p>
         </p:txBody>
       </p:sp>
@@ -866,10 +865,9 @@
           <a:lstStyle/>
           <a:p>
             <a:r>
-              <a:rPr lang="en-US" smtClean="0"/>
+              <a:rPr lang="en-US"/>
               <a:t>Click to edit Master title style</a:t>
             </a:r>
-            <a:endParaRPr lang="en-US"/>
           </a:p>
         </p:txBody>
       </p:sp>
@@ -985,10 +983,9 @@
           </a:lstStyle>
           <a:p>
             <a:r>
-              <a:rPr lang="en-US" smtClean="0"/>
+              <a:rPr lang="en-US"/>
               <a:t>Click to edit Master subtitle style</a:t>
             </a:r>
-            <a:endParaRPr lang="en-US"/>
           </a:p>
         </p:txBody>
       </p:sp>
@@ -1016,7 +1013,7 @@
             </a:pPr>
             <a:fld id="{7B8BCC4C-FAA7-AC45-8FD1-1A5D1E98DD25}" type="datetime1">
               <a:rPr lang="en-US" smtClean="0"/>
-              <a:t>1/3/18</a:t>
+              <a:t>4/1/18</a:t>
             </a:fld>
             <a:endParaRPr lang="en-US"/>
           </a:p>
@@ -1045,7 +1042,7 @@
               <a:defRPr/>
             </a:pPr>
             <a:r>
-              <a:rPr lang="en-US" dirty="0" smtClean="0"/>
+              <a:rPr lang="en-US" dirty="0"/>
               <a:t>This work is licensed under a Creative Commons Attribution 4.0 International License.</a:t>
             </a:r>
           </a:p>
@@ -1125,10 +1122,9 @@
           <a:lstStyle/>
           <a:p>
             <a:r>
-              <a:rPr lang="en-US" smtClean="0"/>
+              <a:rPr lang="en-US"/>
               <a:t>Click to edit Master title style</a:t>
             </a:r>
-            <a:endParaRPr lang="en-US"/>
           </a:p>
         </p:txBody>
       </p:sp>
@@ -1149,38 +1145,37 @@
           <a:p>
             <a:pPr lvl="0"/>
             <a:r>
-              <a:rPr lang="en-US" smtClean="0"/>
+              <a:rPr lang="en-US"/>
               <a:t>Click to edit Master text styles</a:t>
             </a:r>
           </a:p>
           <a:p>
             <a:pPr lvl="1"/>
             <a:r>
-              <a:rPr lang="en-US" smtClean="0"/>
+              <a:rPr lang="en-US"/>
               <a:t>Second level</a:t>
             </a:r>
           </a:p>
           <a:p>
             <a:pPr lvl="2"/>
             <a:r>
-              <a:rPr lang="en-US" smtClean="0"/>
+              <a:rPr lang="en-US"/>
               <a:t>Third level</a:t>
             </a:r>
           </a:p>
           <a:p>
             <a:pPr lvl="3"/>
             <a:r>
-              <a:rPr lang="en-US" smtClean="0"/>
+              <a:rPr lang="en-US"/>
               <a:t>Fourth level</a:t>
             </a:r>
           </a:p>
           <a:p>
             <a:pPr lvl="4"/>
             <a:r>
-              <a:rPr lang="en-US" smtClean="0"/>
+              <a:rPr lang="en-US"/>
               <a:t>Fifth level</a:t>
             </a:r>
-            <a:endParaRPr lang="en-US"/>
           </a:p>
         </p:txBody>
       </p:sp>
@@ -1208,7 +1203,7 @@
             </a:pPr>
             <a:fld id="{DF9053E4-D391-D442-A148-BFA2631C1500}" type="datetime1">
               <a:rPr lang="en-US" smtClean="0"/>
-              <a:t>1/3/18</a:t>
+              <a:t>4/1/18</a:t>
             </a:fld>
             <a:endParaRPr lang="en-US"/>
           </a:p>
@@ -1237,10 +1232,9 @@
               <a:defRPr/>
             </a:pPr>
             <a:r>
-              <a:rPr lang="en-US" smtClean="0"/>
+              <a:rPr lang="en-US"/>
               <a:t>This work is licensed under a Creative Commons Attribution 4.0 International License.</a:t>
             </a:r>
-            <a:endParaRPr lang="en-US"/>
           </a:p>
         </p:txBody>
       </p:sp>
@@ -1323,10 +1317,9 @@
           <a:lstStyle/>
           <a:p>
             <a:r>
-              <a:rPr lang="en-US" smtClean="0"/>
+              <a:rPr lang="en-US"/>
               <a:t>Click to edit Master title style</a:t>
             </a:r>
-            <a:endParaRPr lang="en-US"/>
           </a:p>
         </p:txBody>
       </p:sp>
@@ -1352,38 +1345,37 @@
           <a:p>
             <a:pPr lvl="0"/>
             <a:r>
-              <a:rPr lang="en-US" smtClean="0"/>
+              <a:rPr lang="en-US"/>
               <a:t>Click to edit Master text styles</a:t>
             </a:r>
           </a:p>
           <a:p>
             <a:pPr lvl="1"/>
             <a:r>
-              <a:rPr lang="en-US" smtClean="0"/>
+              <a:rPr lang="en-US"/>
               <a:t>Second level</a:t>
             </a:r>
           </a:p>
           <a:p>
             <a:pPr lvl="2"/>
             <a:r>
-              <a:rPr lang="en-US" smtClean="0"/>
+              <a:rPr lang="en-US"/>
               <a:t>Third level</a:t>
             </a:r>
           </a:p>
           <a:p>
             <a:pPr lvl="3"/>
             <a:r>
-              <a:rPr lang="en-US" smtClean="0"/>
+              <a:rPr lang="en-US"/>
               <a:t>Fourth level</a:t>
             </a:r>
           </a:p>
           <a:p>
             <a:pPr lvl="4"/>
             <a:r>
-              <a:rPr lang="en-US" smtClean="0"/>
+              <a:rPr lang="en-US"/>
               <a:t>Fifth level</a:t>
             </a:r>
-            <a:endParaRPr lang="en-US"/>
           </a:p>
         </p:txBody>
       </p:sp>
@@ -1411,7 +1403,7 @@
             </a:pPr>
             <a:fld id="{647B455B-CB08-CB44-94A2-E0E1AAE53D03}" type="datetime1">
               <a:rPr lang="en-US" smtClean="0"/>
-              <a:t>1/3/18</a:t>
+              <a:t>4/1/18</a:t>
             </a:fld>
             <a:endParaRPr lang="en-US"/>
           </a:p>
@@ -1440,10 +1432,9 @@
               <a:defRPr/>
             </a:pPr>
             <a:r>
-              <a:rPr lang="en-US" smtClean="0"/>
+              <a:rPr lang="en-US"/>
               <a:t>This work is licensed under a Creative Commons Attribution 4.0 International License.</a:t>
             </a:r>
-            <a:endParaRPr lang="en-US"/>
           </a:p>
         </p:txBody>
       </p:sp>
@@ -1521,10 +1512,9 @@
           <a:lstStyle/>
           <a:p>
             <a:r>
-              <a:rPr lang="en-US" dirty="0" smtClean="0"/>
+              <a:rPr lang="en-US" dirty="0"/>
               <a:t>Click to edit Master title style</a:t>
             </a:r>
-            <a:endParaRPr lang="en-US" dirty="0"/>
           </a:p>
         </p:txBody>
       </p:sp>
@@ -1545,38 +1535,37 @@
           <a:p>
             <a:pPr lvl="0"/>
             <a:r>
-              <a:rPr lang="en-US" dirty="0" smtClean="0"/>
+              <a:rPr lang="en-US" dirty="0"/>
               <a:t>Click to edit Master text styles</a:t>
             </a:r>
           </a:p>
           <a:p>
             <a:pPr lvl="1"/>
             <a:r>
-              <a:rPr lang="en-US" dirty="0" smtClean="0"/>
+              <a:rPr lang="en-US" dirty="0"/>
               <a:t>Second level</a:t>
             </a:r>
           </a:p>
           <a:p>
             <a:pPr lvl="2"/>
             <a:r>
-              <a:rPr lang="en-US" dirty="0" smtClean="0"/>
+              <a:rPr lang="en-US" dirty="0"/>
               <a:t>Third level</a:t>
             </a:r>
           </a:p>
           <a:p>
             <a:pPr lvl="3"/>
             <a:r>
-              <a:rPr lang="en-US" dirty="0" smtClean="0"/>
+              <a:rPr lang="en-US" dirty="0"/>
               <a:t>Fourth level</a:t>
             </a:r>
           </a:p>
           <a:p>
             <a:pPr lvl="4"/>
             <a:r>
-              <a:rPr lang="en-US" dirty="0" smtClean="0"/>
+              <a:rPr lang="en-US" dirty="0"/>
               <a:t>Fifth level</a:t>
             </a:r>
-            <a:endParaRPr lang="en-US" dirty="0"/>
           </a:p>
         </p:txBody>
       </p:sp>
@@ -1604,7 +1593,7 @@
             </a:pPr>
             <a:fld id="{1BB21FFC-4F79-BF48-85DE-30A3DC22A95F}" type="datetime1">
               <a:rPr lang="en-US" smtClean="0"/>
-              <a:t>1/3/18</a:t>
+              <a:t>4/1/18</a:t>
             </a:fld>
             <a:endParaRPr lang="en-US"/>
           </a:p>
@@ -1633,7 +1622,7 @@
               <a:defRPr/>
             </a:pPr>
             <a:r>
-              <a:rPr lang="en-US" dirty="0" smtClean="0"/>
+              <a:rPr lang="en-US" dirty="0"/>
               <a:t>This work is licensed under a Creative Commons Attribution 4.0 International License.</a:t>
             </a:r>
           </a:p>
@@ -1722,10 +1711,9 @@
           </a:lstStyle>
           <a:p>
             <a:r>
-              <a:rPr lang="en-US" smtClean="0"/>
+              <a:rPr lang="en-US"/>
               <a:t>Click to edit Master title style</a:t>
             </a:r>
-            <a:endParaRPr lang="en-US"/>
           </a:p>
         </p:txBody>
       </p:sp>
@@ -1842,7 +1830,7 @@
           <a:p>
             <a:pPr lvl="0"/>
             <a:r>
-              <a:rPr lang="en-US" smtClean="0"/>
+              <a:rPr lang="en-US"/>
               <a:t>Click to edit Master text styles</a:t>
             </a:r>
           </a:p>
@@ -1872,7 +1860,7 @@
             </a:pPr>
             <a:fld id="{47CE67E5-02A1-DA40-A385-9A7A6F0F4A16}" type="datetime1">
               <a:rPr lang="en-US" smtClean="0"/>
-              <a:t>1/3/18</a:t>
+              <a:t>4/1/18</a:t>
             </a:fld>
             <a:endParaRPr lang="en-US"/>
           </a:p>
@@ -1901,10 +1889,9 @@
               <a:defRPr/>
             </a:pPr>
             <a:r>
-              <a:rPr lang="en-US" smtClean="0"/>
+              <a:rPr lang="en-US"/>
               <a:t>This work is licensed under a Creative Commons Attribution 4.0 International License.</a:t>
             </a:r>
-            <a:endParaRPr lang="en-US"/>
           </a:p>
         </p:txBody>
       </p:sp>
@@ -1982,10 +1969,9 @@
           <a:lstStyle/>
           <a:p>
             <a:r>
-              <a:rPr lang="en-US" smtClean="0"/>
+              <a:rPr lang="en-US"/>
               <a:t>Click to edit Master title style</a:t>
             </a:r>
-            <a:endParaRPr lang="en-US"/>
           </a:p>
         </p:txBody>
       </p:sp>
@@ -2039,38 +2025,37 @@
           <a:p>
             <a:pPr lvl="0"/>
             <a:r>
-              <a:rPr lang="en-US" smtClean="0"/>
+              <a:rPr lang="en-US"/>
               <a:t>Click to edit Master text styles</a:t>
             </a:r>
           </a:p>
           <a:p>
             <a:pPr lvl="1"/>
             <a:r>
-              <a:rPr lang="en-US" smtClean="0"/>
+              <a:rPr lang="en-US"/>
               <a:t>Second level</a:t>
             </a:r>
           </a:p>
           <a:p>
             <a:pPr lvl="2"/>
             <a:r>
-              <a:rPr lang="en-US" smtClean="0"/>
+              <a:rPr lang="en-US"/>
               <a:t>Third level</a:t>
             </a:r>
           </a:p>
           <a:p>
             <a:pPr lvl="3"/>
             <a:r>
-              <a:rPr lang="en-US" smtClean="0"/>
+              <a:rPr lang="en-US"/>
               <a:t>Fourth level</a:t>
             </a:r>
           </a:p>
           <a:p>
             <a:pPr lvl="4"/>
             <a:r>
-              <a:rPr lang="en-US" smtClean="0"/>
+              <a:rPr lang="en-US"/>
               <a:t>Fifth level</a:t>
             </a:r>
-            <a:endParaRPr lang="en-US"/>
           </a:p>
         </p:txBody>
       </p:sp>
@@ -2124,38 +2109,37 @@
           <a:p>
             <a:pPr lvl="0"/>
             <a:r>
-              <a:rPr lang="en-US" smtClean="0"/>
+              <a:rPr lang="en-US"/>
               <a:t>Click to edit Master text styles</a:t>
             </a:r>
           </a:p>
           <a:p>
             <a:pPr lvl="1"/>
             <a:r>
-              <a:rPr lang="en-US" smtClean="0"/>
+              <a:rPr lang="en-US"/>
               <a:t>Second level</a:t>
             </a:r>
           </a:p>
           <a:p>
             <a:pPr lvl="2"/>
             <a:r>
-              <a:rPr lang="en-US" smtClean="0"/>
+              <a:rPr lang="en-US"/>
               <a:t>Third level</a:t>
             </a:r>
           </a:p>
           <a:p>
             <a:pPr lvl="3"/>
             <a:r>
-              <a:rPr lang="en-US" smtClean="0"/>
+              <a:rPr lang="en-US"/>
               <a:t>Fourth level</a:t>
             </a:r>
           </a:p>
           <a:p>
             <a:pPr lvl="4"/>
             <a:r>
-              <a:rPr lang="en-US" smtClean="0"/>
+              <a:rPr lang="en-US"/>
               <a:t>Fifth level</a:t>
             </a:r>
-            <a:endParaRPr lang="en-US"/>
           </a:p>
         </p:txBody>
       </p:sp>
@@ -2183,7 +2167,7 @@
             </a:pPr>
             <a:fld id="{CC604390-33B9-5F4D-B13D-D28252CE5B94}" type="datetime1">
               <a:rPr lang="en-US" smtClean="0"/>
-              <a:t>1/3/18</a:t>
+              <a:t>4/1/18</a:t>
             </a:fld>
             <a:endParaRPr lang="en-US"/>
           </a:p>
@@ -2212,10 +2196,9 @@
               <a:defRPr/>
             </a:pPr>
             <a:r>
-              <a:rPr lang="en-US" smtClean="0"/>
+              <a:rPr lang="en-US"/>
               <a:t>This work is licensed under a Creative Commons Attribution 4.0 International License.</a:t>
             </a:r>
-            <a:endParaRPr lang="en-US"/>
           </a:p>
         </p:txBody>
       </p:sp>
@@ -2297,10 +2280,9 @@
           </a:lstStyle>
           <a:p>
             <a:r>
-              <a:rPr lang="en-US" smtClean="0"/>
+              <a:rPr lang="en-US"/>
               <a:t>Click to edit Master title style</a:t>
             </a:r>
-            <a:endParaRPr lang="en-US"/>
           </a:p>
         </p:txBody>
       </p:sp>
@@ -2363,7 +2345,7 @@
           <a:p>
             <a:pPr lvl="0"/>
             <a:r>
-              <a:rPr lang="en-US" smtClean="0"/>
+              <a:rPr lang="en-US"/>
               <a:t>Click to edit Master text styles</a:t>
             </a:r>
           </a:p>
@@ -2419,38 +2401,37 @@
           <a:p>
             <a:pPr lvl="0"/>
             <a:r>
-              <a:rPr lang="en-US" smtClean="0"/>
+              <a:rPr lang="en-US"/>
               <a:t>Click to edit Master text styles</a:t>
             </a:r>
           </a:p>
           <a:p>
             <a:pPr lvl="1"/>
             <a:r>
-              <a:rPr lang="en-US" smtClean="0"/>
+              <a:rPr lang="en-US"/>
               <a:t>Second level</a:t>
             </a:r>
           </a:p>
           <a:p>
             <a:pPr lvl="2"/>
             <a:r>
-              <a:rPr lang="en-US" smtClean="0"/>
+              <a:rPr lang="en-US"/>
               <a:t>Third level</a:t>
             </a:r>
           </a:p>
           <a:p>
             <a:pPr lvl="3"/>
             <a:r>
-              <a:rPr lang="en-US" smtClean="0"/>
+              <a:rPr lang="en-US"/>
               <a:t>Fourth level</a:t>
             </a:r>
           </a:p>
           <a:p>
             <a:pPr lvl="4"/>
             <a:r>
-              <a:rPr lang="en-US" smtClean="0"/>
+              <a:rPr lang="en-US"/>
               <a:t>Fifth level</a:t>
             </a:r>
-            <a:endParaRPr lang="en-US"/>
           </a:p>
         </p:txBody>
       </p:sp>
@@ -2513,7 +2494,7 @@
           <a:p>
             <a:pPr lvl="0"/>
             <a:r>
-              <a:rPr lang="en-US" smtClean="0"/>
+              <a:rPr lang="en-US"/>
               <a:t>Click to edit Master text styles</a:t>
             </a:r>
           </a:p>
@@ -2569,38 +2550,37 @@
           <a:p>
             <a:pPr lvl="0"/>
             <a:r>
-              <a:rPr lang="en-US" smtClean="0"/>
+              <a:rPr lang="en-US"/>
               <a:t>Click to edit Master text styles</a:t>
             </a:r>
           </a:p>
           <a:p>
             <a:pPr lvl="1"/>
             <a:r>
-              <a:rPr lang="en-US" smtClean="0"/>
+              <a:rPr lang="en-US"/>
               <a:t>Second level</a:t>
             </a:r>
           </a:p>
           <a:p>
             <a:pPr lvl="2"/>
             <a:r>
-              <a:rPr lang="en-US" smtClean="0"/>
+              <a:rPr lang="en-US"/>
               <a:t>Third level</a:t>
             </a:r>
           </a:p>
           <a:p>
             <a:pPr lvl="3"/>
             <a:r>
-              <a:rPr lang="en-US" smtClean="0"/>
+              <a:rPr lang="en-US"/>
               <a:t>Fourth level</a:t>
             </a:r>
           </a:p>
           <a:p>
             <a:pPr lvl="4"/>
             <a:r>
-              <a:rPr lang="en-US" smtClean="0"/>
+              <a:rPr lang="en-US"/>
               <a:t>Fifth level</a:t>
             </a:r>
-            <a:endParaRPr lang="en-US"/>
           </a:p>
         </p:txBody>
       </p:sp>
@@ -2628,7 +2608,7 @@
             </a:pPr>
             <a:fld id="{6F44B48B-8C2F-1A47-AA18-DF9ED05E8DE2}" type="datetime1">
               <a:rPr lang="en-US" smtClean="0"/>
-              <a:t>1/3/18</a:t>
+              <a:t>4/1/18</a:t>
             </a:fld>
             <a:endParaRPr lang="en-US"/>
           </a:p>
@@ -2657,10 +2637,9 @@
               <a:defRPr/>
             </a:pPr>
             <a:r>
-              <a:rPr lang="en-US" smtClean="0"/>
+              <a:rPr lang="en-US"/>
               <a:t>This work is licensed under a Creative Commons Attribution 4.0 International License.</a:t>
             </a:r>
-            <a:endParaRPr lang="en-US"/>
           </a:p>
         </p:txBody>
       </p:sp>
@@ -2738,10 +2717,9 @@
           <a:lstStyle/>
           <a:p>
             <a:r>
-              <a:rPr lang="en-US" smtClean="0"/>
+              <a:rPr lang="en-US"/>
               <a:t>Click to edit Master title style</a:t>
             </a:r>
-            <a:endParaRPr lang="en-US"/>
           </a:p>
         </p:txBody>
       </p:sp>
@@ -2769,7 +2747,7 @@
             </a:pPr>
             <a:fld id="{4AFD0EE6-B95D-EA41-AF33-2A7518575B93}" type="datetime1">
               <a:rPr lang="en-US" smtClean="0"/>
-              <a:t>1/3/18</a:t>
+              <a:t>4/1/18</a:t>
             </a:fld>
             <a:endParaRPr lang="en-US"/>
           </a:p>
@@ -2798,10 +2776,9 @@
               <a:defRPr/>
             </a:pPr>
             <a:r>
-              <a:rPr lang="en-US" smtClean="0"/>
+              <a:rPr lang="en-US"/>
               <a:t>This work is licensed under a Creative Commons Attribution 4.0 International License.</a:t>
             </a:r>
-            <a:endParaRPr lang="en-US"/>
           </a:p>
         </p:txBody>
       </p:sp>
@@ -2887,7 +2864,7 @@
             </a:pPr>
             <a:fld id="{2EF556CF-9E9B-0C42-BCA2-D1F8E5C7FCAA}" type="datetime1">
               <a:rPr lang="en-US" smtClean="0"/>
-              <a:t>1/3/18</a:t>
+              <a:t>4/1/18</a:t>
             </a:fld>
             <a:endParaRPr lang="en-US"/>
           </a:p>
@@ -2916,10 +2893,9 @@
               <a:defRPr/>
             </a:pPr>
             <a:r>
-              <a:rPr lang="en-US" smtClean="0"/>
+              <a:rPr lang="en-US"/>
               <a:t>This work is licensed under a Creative Commons Attribution 4.0 International License.</a:t>
             </a:r>
-            <a:endParaRPr lang="en-US"/>
           </a:p>
         </p:txBody>
       </p:sp>
@@ -3006,10 +2982,9 @@
           </a:lstStyle>
           <a:p>
             <a:r>
-              <a:rPr lang="en-US" smtClean="0"/>
+              <a:rPr lang="en-US"/>
               <a:t>Click to edit Master title style</a:t>
             </a:r>
-            <a:endParaRPr lang="en-US"/>
           </a:p>
         </p:txBody>
       </p:sp>
@@ -3063,38 +3038,37 @@
           <a:p>
             <a:pPr lvl="0"/>
             <a:r>
-              <a:rPr lang="en-US" smtClean="0"/>
+              <a:rPr lang="en-US"/>
               <a:t>Click to edit Master text styles</a:t>
             </a:r>
           </a:p>
           <a:p>
             <a:pPr lvl="1"/>
             <a:r>
-              <a:rPr lang="en-US" smtClean="0"/>
+              <a:rPr lang="en-US"/>
               <a:t>Second level</a:t>
             </a:r>
           </a:p>
           <a:p>
             <a:pPr lvl="2"/>
             <a:r>
-              <a:rPr lang="en-US" smtClean="0"/>
+              <a:rPr lang="en-US"/>
               <a:t>Third level</a:t>
             </a:r>
           </a:p>
           <a:p>
             <a:pPr lvl="3"/>
             <a:r>
-              <a:rPr lang="en-US" smtClean="0"/>
+              <a:rPr lang="en-US"/>
               <a:t>Fourth level</a:t>
             </a:r>
           </a:p>
           <a:p>
             <a:pPr lvl="4"/>
             <a:r>
-              <a:rPr lang="en-US" smtClean="0"/>
+              <a:rPr lang="en-US"/>
               <a:t>Fifth level</a:t>
             </a:r>
-            <a:endParaRPr lang="en-US"/>
           </a:p>
         </p:txBody>
       </p:sp>
@@ -3157,7 +3131,7 @@
           <a:p>
             <a:pPr lvl="0"/>
             <a:r>
-              <a:rPr lang="en-US" smtClean="0"/>
+              <a:rPr lang="en-US"/>
               <a:t>Click to edit Master text styles</a:t>
             </a:r>
           </a:p>
@@ -3187,7 +3161,7 @@
             </a:pPr>
             <a:fld id="{30DDBE65-6E8E-A843-92A3-1B013FB415BC}" type="datetime1">
               <a:rPr lang="en-US" smtClean="0"/>
-              <a:t>1/3/18</a:t>
+              <a:t>4/1/18</a:t>
             </a:fld>
             <a:endParaRPr lang="en-US"/>
           </a:p>
@@ -3216,10 +3190,9 @@
               <a:defRPr/>
             </a:pPr>
             <a:r>
-              <a:rPr lang="en-US" smtClean="0"/>
+              <a:rPr lang="en-US"/>
               <a:t>This work is licensed under a Creative Commons Attribution 4.0 International License.</a:t>
             </a:r>
-            <a:endParaRPr lang="en-US"/>
           </a:p>
         </p:txBody>
       </p:sp>
@@ -3306,10 +3279,9 @@
           </a:lstStyle>
           <a:p>
             <a:r>
-              <a:rPr lang="en-US" smtClean="0"/>
+              <a:rPr lang="en-US"/>
               <a:t>Click to edit Master title style</a:t>
             </a:r>
-            <a:endParaRPr lang="en-US"/>
           </a:p>
         </p:txBody>
       </p:sp>
@@ -3436,7 +3408,7 @@
           <a:p>
             <a:pPr lvl="0"/>
             <a:r>
-              <a:rPr lang="en-US" smtClean="0"/>
+              <a:rPr lang="en-US"/>
               <a:t>Click to edit Master text styles</a:t>
             </a:r>
           </a:p>
@@ -3466,7 +3438,7 @@
             </a:pPr>
             <a:fld id="{5D869E41-1228-1649-AE05-3AEEC09773E5}" type="datetime1">
               <a:rPr lang="en-US" smtClean="0"/>
-              <a:t>1/3/18</a:t>
+              <a:t>4/1/18</a:t>
             </a:fld>
             <a:endParaRPr lang="en-US"/>
           </a:p>
@@ -3495,10 +3467,9 @@
               <a:defRPr/>
             </a:pPr>
             <a:r>
-              <a:rPr lang="en-US" smtClean="0"/>
+              <a:rPr lang="en-US"/>
               <a:t>This work is licensed under a Creative Commons Attribution 4.0 International License.</a:t>
             </a:r>
-            <a:endParaRPr lang="en-US"/>
           </a:p>
         </p:txBody>
       </p:sp>
@@ -3717,7 +3688,7 @@
             </a:pPr>
             <a:fld id="{2AB9D791-AB10-1145-BC0D-F545658CE146}" type="datetime1">
               <a:rPr lang="en-US" smtClean="0"/>
-              <a:t>1/3/18</a:t>
+              <a:t>4/1/18</a:t>
             </a:fld>
             <a:endParaRPr lang="en-US"/>
           </a:p>
@@ -3778,10 +3749,9 @@
               <a:defRPr/>
             </a:pPr>
             <a:r>
-              <a:rPr lang="en-US" dirty="0" smtClean="0"/>
+              <a:rPr lang="en-US" dirty="0"/>
               <a:t>This work is licensed under a Creative Commons Attribution 4.0 International License.</a:t>
             </a:r>
-            <a:endParaRPr lang="en-US" dirty="0"/>
           </a:p>
         </p:txBody>
       </p:sp>
@@ -4357,18 +4327,9 @@
           <a:p>
             <a:pPr algn="ctr"/>
             <a:r>
-              <a:rPr lang="en-US" dirty="0" smtClean="0"/>
-              <a:t>Quick Introduction to </a:t>
-            </a:r>
-            <a:r>
               <a:rPr lang="en-US" dirty="0"/>
-              <a:t>SBOL Visual </a:t>
-            </a:r>
-            <a:r>
-              <a:rPr lang="en-US" dirty="0" smtClean="0"/>
-              <a:t>2.0</a:t>
-            </a:r>
-            <a:endParaRPr lang="en-US" dirty="0"/>
+              <a:t>Quick Introduction to SBOL Visual 2.0</a:t>
+            </a:r>
           </a:p>
         </p:txBody>
       </p:sp>
@@ -4388,7 +4349,7 @@
           <a:lstStyle/>
           <a:p>
             <a:r>
-              <a:rPr lang="en-US" dirty="0" smtClean="0"/>
+              <a:rPr lang="en-US" dirty="0"/>
               <a:t>January 2018</a:t>
             </a:r>
           </a:p>
@@ -4418,7 +4379,7 @@
               <a:defRPr/>
             </a:pPr>
             <a:r>
-              <a:rPr lang="en-US" i="1" dirty="0" smtClean="0"/>
+              <a:rPr lang="en-US" i="1" dirty="0"/>
               <a:t>This work is licensed under a Creative Commons Attribution 4.0 International License.</a:t>
             </a:r>
           </a:p>
@@ -4434,13 +4395,6 @@
   <p:clrMapOvr>
     <a:masterClrMapping/>
   </p:clrMapOvr>
-  <p:timing>
-    <p:tnLst>
-      <p:par>
-        <p:cTn id="1" dur="indefinite" restart="never" nodeType="tmRoot"/>
-      </p:par>
-    </p:tnLst>
-  </p:timing>
 </p:sld>
 </file>
 
@@ -4642,7 +4596,7 @@
           <a:p>
             <a:pPr algn="ctr"/>
             <a:r>
-              <a:rPr lang="en-US" i="1" dirty="0" err="1" smtClean="0">
+              <a:rPr lang="en-US" i="1" dirty="0" err="1">
                 <a:solidFill>
                   <a:schemeClr val="tx1"/>
                 </a:solidFill>
@@ -5088,7 +5042,7 @@
           <a:lstStyle/>
           <a:p>
             <a:r>
-              <a:rPr lang="en-US" i="1" dirty="0" err="1" smtClean="0"/>
+              <a:rPr lang="en-US" i="1" dirty="0" err="1"/>
               <a:t>tetR</a:t>
             </a:r>
             <a:endParaRPr lang="en-US" i="1" dirty="0"/>
@@ -5162,7 +5116,7 @@
           <a:lstStyle/>
           <a:p>
             <a:r>
-              <a:rPr lang="en-US" b="1" dirty="0" smtClean="0">
+              <a:rPr lang="en-US" b="1" dirty="0">
                 <a:solidFill>
                   <a:schemeClr val="tx1">
                     <a:lumMod val="65000"/>
@@ -5172,14 +5126,6 @@
               </a:rPr>
               <a:t>Nucleic Acid Backbone</a:t>
             </a:r>
-            <a:endParaRPr lang="en-US" b="1" dirty="0">
-              <a:solidFill>
-                <a:schemeClr val="tx1">
-                  <a:lumMod val="65000"/>
-                  <a:lumOff val="35000"/>
-                </a:schemeClr>
-              </a:solidFill>
-            </a:endParaRPr>
           </a:p>
         </p:txBody>
       </p:sp>
@@ -5207,7 +5153,7 @@
           <a:lstStyle/>
           <a:p>
             <a:r>
-              <a:rPr lang="en-US" b="1" dirty="0" smtClean="0">
+              <a:rPr lang="en-US" b="1" dirty="0">
                 <a:solidFill>
                   <a:schemeClr val="tx1">
                     <a:lumMod val="65000"/>
@@ -5217,14 +5163,6 @@
               </a:rPr>
               <a:t>Sequence Feature Glyphs</a:t>
             </a:r>
-            <a:endParaRPr lang="en-US" b="1" dirty="0">
-              <a:solidFill>
-                <a:schemeClr val="tx1">
-                  <a:lumMod val="65000"/>
-                  <a:lumOff val="35000"/>
-                </a:schemeClr>
-              </a:solidFill>
-            </a:endParaRPr>
           </a:p>
         </p:txBody>
       </p:sp>
@@ -5253,7 +5191,7 @@
           <a:p>
             <a:pPr algn="ctr"/>
             <a:r>
-              <a:rPr lang="en-US" b="1" dirty="0" smtClean="0">
+              <a:rPr lang="en-US" b="1" dirty="0">
                 <a:solidFill>
                   <a:schemeClr val="tx1">
                     <a:lumMod val="65000"/>
@@ -5267,7 +5205,7 @@
           <a:p>
             <a:pPr algn="ctr"/>
             <a:r>
-              <a:rPr lang="en-US" b="1" dirty="0" smtClean="0">
+              <a:rPr lang="en-US" b="1" dirty="0">
                 <a:solidFill>
                   <a:schemeClr val="tx1">
                     <a:lumMod val="65000"/>
@@ -5277,14 +5215,6 @@
               </a:rPr>
               <a:t>Acid Component Glyphs</a:t>
             </a:r>
-            <a:endParaRPr lang="en-US" b="1" dirty="0">
-              <a:solidFill>
-                <a:schemeClr val="tx1">
-                  <a:lumMod val="65000"/>
-                  <a:lumOff val="35000"/>
-                </a:schemeClr>
-              </a:solidFill>
-            </a:endParaRPr>
           </a:p>
         </p:txBody>
       </p:sp>
@@ -5564,7 +5494,7 @@
           <a:lstStyle/>
           <a:p>
             <a:r>
-              <a:rPr lang="en-US" b="1" dirty="0" smtClean="0">
+              <a:rPr lang="en-US" b="1" dirty="0">
                 <a:solidFill>
                   <a:schemeClr val="tx1">
                     <a:lumMod val="65000"/>
@@ -5574,14 +5504,6 @@
               </a:rPr>
               <a:t>Labels</a:t>
             </a:r>
-            <a:endParaRPr lang="en-US" b="1" dirty="0">
-              <a:solidFill>
-                <a:schemeClr val="tx1">
-                  <a:lumMod val="65000"/>
-                  <a:lumOff val="35000"/>
-                </a:schemeClr>
-              </a:solidFill>
-            </a:endParaRPr>
           </a:p>
         </p:txBody>
       </p:sp>
@@ -5781,7 +5703,7 @@
           <a:lstStyle/>
           <a:p>
             <a:r>
-              <a:rPr lang="en-US" b="1" dirty="0" smtClean="0">
+              <a:rPr lang="en-US" b="1" dirty="0">
                 <a:solidFill>
                   <a:schemeClr val="tx1">
                     <a:lumMod val="65000"/>
@@ -5791,14 +5713,6 @@
               </a:rPr>
               <a:t>Interactions</a:t>
             </a:r>
-            <a:endParaRPr lang="en-US" b="1" dirty="0">
-              <a:solidFill>
-                <a:schemeClr val="tx1">
-                  <a:lumMod val="65000"/>
-                  <a:lumOff val="35000"/>
-                </a:schemeClr>
-              </a:solidFill>
-            </a:endParaRPr>
           </a:p>
         </p:txBody>
       </p:sp>
@@ -5889,18 +5803,13 @@
           <a:p>
             <a:pPr algn="ctr"/>
             <a:r>
-              <a:rPr lang="en-US" dirty="0" smtClean="0">
+              <a:rPr lang="en-US" dirty="0">
                 <a:solidFill>
                   <a:srgbClr val="000000"/>
                 </a:solidFill>
               </a:rPr>
               <a:t>GFP</a:t>
             </a:r>
-            <a:endParaRPr lang="en-US" dirty="0">
-              <a:solidFill>
-                <a:srgbClr val="000000"/>
-              </a:solidFill>
-            </a:endParaRPr>
           </a:p>
         </p:txBody>
       </p:sp>
@@ -6011,7 +5920,7 @@
           <a:lstStyle/>
           <a:p>
             <a:r>
-              <a:rPr lang="en-US" b="1" smtClean="0">
+              <a:rPr lang="en-US" b="1">
                 <a:solidFill>
                   <a:schemeClr val="tx1">
                     <a:lumMod val="65000"/>
@@ -6129,10 +6038,9 @@
           <a:lstStyle/>
           <a:p>
             <a:r>
-              <a:rPr lang="en-US" dirty="0" smtClean="0"/>
+              <a:rPr lang="en-US" dirty="0"/>
               <a:t>Diagram Elements</a:t>
             </a:r>
-            <a:endParaRPr lang="en-US" dirty="0"/>
           </a:p>
         </p:txBody>
       </p:sp>
@@ -6168,21 +6076,10 @@
                   </a:schemeClr>
                 </a:solidFill>
               </a:rPr>
-              <a:t>G</a:t>
-            </a:r>
-            <a:r>
-              <a:rPr lang="en-US" b="1" i="1" smtClean="0">
-                <a:solidFill>
-                  <a:schemeClr val="tx1">
-                    <a:lumMod val="65000"/>
-                    <a:lumOff val="35000"/>
-                  </a:schemeClr>
-                </a:solidFill>
-              </a:rPr>
-              <a:t>rey </a:t>
-            </a:r>
-            <a:r>
-              <a:rPr lang="en-US" b="1" i="1" dirty="0" smtClean="0">
+              <a:t>Grey </a:t>
+            </a:r>
+            <a:r>
+              <a:rPr lang="en-US" b="1" i="1" dirty="0">
                 <a:solidFill>
                   <a:schemeClr val="tx1">
                     <a:lumMod val="65000"/>
@@ -6192,14 +6089,6 @@
               </a:rPr>
               <a:t>text and lines (including this) are annotations</a:t>
             </a:r>
-            <a:endParaRPr lang="en-US" b="1" i="1" dirty="0">
-              <a:solidFill>
-                <a:schemeClr val="tx1">
-                  <a:lumMod val="65000"/>
-                  <a:lumOff val="35000"/>
-                </a:schemeClr>
-              </a:solidFill>
-            </a:endParaRPr>
           </a:p>
         </p:txBody>
       </p:sp>
@@ -6213,13 +6102,6 @@
   <p:clrMapOvr>
     <a:masterClrMapping/>
   </p:clrMapOvr>
-  <p:timing>
-    <p:tnLst>
-      <p:par>
-        <p:cTn id="1" dur="indefinite" restart="never" nodeType="tmRoot"/>
-      </p:par>
-    </p:tnLst>
-  </p:timing>
 </p:sld>
 </file>
 
@@ -6375,15 +6257,7 @@
                   <a:schemeClr val="tx2"/>
                 </a:solidFill>
               </a:rPr>
-              <a:t>, </a:t>
-            </a:r>
-            <a:r>
-              <a:rPr lang="en-US" sz="2400" i="1" smtClean="0">
-                <a:solidFill>
-                  <a:schemeClr val="tx2"/>
-                </a:solidFill>
-              </a:rPr>
-              <a:t>Strands, Styling: </a:t>
+              <a:t>, Strands, Styling: </a:t>
             </a:r>
             <a:r>
               <a:rPr lang="en-US" sz="2400" i="1" dirty="0">
@@ -6673,13 +6547,6 @@
   <p:clrMapOvr>
     <a:masterClrMapping/>
   </p:clrMapOvr>
-  <p:timing>
-    <p:tnLst>
-      <p:par>
-        <p:cTn id="1" dur="indefinite" restart="never" nodeType="tmRoot"/>
-      </p:par>
-    </p:tnLst>
-  </p:timing>
 </p:sld>
 </file>
 
@@ -6716,10 +6583,9 @@
           <a:lstStyle/>
           <a:p>
             <a:r>
-              <a:rPr lang="en-US" dirty="0" smtClean="0"/>
+              <a:rPr lang="en-US" dirty="0"/>
               <a:t>Complex Example Diagram</a:t>
             </a:r>
-            <a:endParaRPr lang="en-US" dirty="0"/>
           </a:p>
         </p:txBody>
       </p:sp>
@@ -6731,7 +6597,7 @@
         </p:nvCxnSpPr>
         <p:spPr>
           <a:xfrm rot="5400000">
-            <a:off x="4077541" y="2755577"/>
+            <a:off x="4077541" y="2361630"/>
             <a:ext cx="521446" cy="432701"/>
           </a:xfrm>
           <a:prstGeom prst="bentConnector3">
@@ -6766,17 +6632,19 @@
       <p:cxnSp>
         <p:nvCxnSpPr>
           <p:cNvPr id="4" name="Elbow Connector 3"/>
-          <p:cNvCxnSpPr/>
+          <p:cNvCxnSpPr>
+            <a:cxnSpLocks/>
+          </p:cNvCxnSpPr>
           <p:nvPr/>
         </p:nvCxnSpPr>
         <p:spPr>
           <a:xfrm flipV="1">
-            <a:off x="4770705" y="3283387"/>
-            <a:ext cx="1278811" cy="135204"/>
+            <a:off x="4793607" y="2984711"/>
+            <a:ext cx="1618079" cy="294714"/>
           </a:xfrm>
           <a:prstGeom prst="bentConnector3">
             <a:avLst>
-              <a:gd name="adj1" fmla="val 497"/>
+              <a:gd name="adj1" fmla="val 216"/>
             </a:avLst>
           </a:prstGeom>
           <a:ln>
@@ -6811,7 +6679,7 @@
         </p:nvGrpSpPr>
         <p:grpSpPr>
           <a:xfrm>
-            <a:off x="1858517" y="1800728"/>
+            <a:off x="1858517" y="1406781"/>
             <a:ext cx="4191000" cy="1183983"/>
             <a:chOff x="2387824" y="2155732"/>
             <a:chExt cx="4191000" cy="1183983"/>
@@ -6956,15 +6824,7 @@
                     <a:schemeClr val="tx1"/>
                   </a:solidFill>
                 </a:rPr>
-                <a:t>t</a:t>
-              </a:r>
-              <a:r>
-                <a:rPr lang="en-US" i="1" dirty="0" err="1" smtClean="0">
-                  <a:solidFill>
-                    <a:schemeClr val="tx1"/>
-                  </a:solidFill>
-                </a:rPr>
-                <a:t>etr</a:t>
+                <a:t>tetr</a:t>
               </a:r>
               <a:endParaRPr lang="en-US" i="1" dirty="0">
                 <a:solidFill>
@@ -7167,7 +7027,7 @@
             <a:lstStyle/>
             <a:p>
               <a:r>
-                <a:rPr lang="en-US" smtClean="0"/>
+                <a:rPr lang="en-US"/>
                 <a:t>J23101</a:t>
               </a:r>
               <a:endParaRPr lang="en-US" dirty="0"/>
@@ -7323,7 +7183,7 @@
             <a:p>
               <a:pPr algn="ctr"/>
               <a:r>
-                <a:rPr lang="en-US" i="1" dirty="0" err="1" smtClean="0">
+                <a:rPr lang="en-US" i="1" dirty="0" err="1">
                   <a:solidFill>
                     <a:schemeClr val="tx1"/>
                   </a:solidFill>
@@ -7542,17 +7402,19 @@
       <p:cxnSp>
         <p:nvCxnSpPr>
           <p:cNvPr id="21" name="Elbow Connector 20"/>
-          <p:cNvCxnSpPr/>
+          <p:cNvCxnSpPr>
+            <a:cxnSpLocks/>
+          </p:cNvCxnSpPr>
           <p:nvPr/>
         </p:nvCxnSpPr>
         <p:spPr>
           <a:xfrm rot="10800000" flipV="1">
-            <a:off x="2594893" y="3237270"/>
-            <a:ext cx="880356" cy="349390"/>
+            <a:off x="2594893" y="2814532"/>
+            <a:ext cx="892434" cy="772128"/>
           </a:xfrm>
           <a:prstGeom prst="bentConnector3">
             <a:avLst>
-              <a:gd name="adj1" fmla="val 101934"/>
+              <a:gd name="adj1" fmla="val 98791"/>
             </a:avLst>
           </a:prstGeom>
           <a:ln>
@@ -7622,7 +7484,7 @@
         </p:nvCxnSpPr>
         <p:spPr>
           <a:xfrm>
-            <a:off x="6784088" y="3283386"/>
+            <a:off x="7132432" y="2978583"/>
             <a:ext cx="577443" cy="12700"/>
           </a:xfrm>
           <a:prstGeom prst="straightConnector1">
@@ -7660,7 +7522,7 @@
         </p:nvSpPr>
         <p:spPr>
           <a:xfrm>
-            <a:off x="7300288" y="2992152"/>
+            <a:off x="7648632" y="2687349"/>
             <a:ext cx="557573" cy="646331"/>
           </a:xfrm>
           <a:prstGeom prst="rect">
@@ -7675,10 +7537,9 @@
           <a:lstStyle/>
           <a:p>
             <a:r>
-              <a:rPr lang="en-US" sz="3600" b="1" smtClean="0"/>
+              <a:rPr lang="en-US" sz="3600" b="1"/>
               <a:t>∅</a:t>
             </a:r>
-            <a:endParaRPr lang="en-US" sz="3600" b="1"/>
           </a:p>
         </p:txBody>
       </p:sp>
@@ -7704,7 +7565,7 @@
         </p:blipFill>
         <p:spPr>
           <a:xfrm>
-            <a:off x="4259150" y="3058995"/>
+            <a:off x="4259150" y="2928364"/>
             <a:ext cx="1018544" cy="1018544"/>
           </a:xfrm>
           <a:prstGeom prst="rect">
@@ -7715,13 +7576,15 @@
       <p:cxnSp>
         <p:nvCxnSpPr>
           <p:cNvPr id="29" name="Elbow Connector 40"/>
-          <p:cNvCxnSpPr/>
+          <p:cNvCxnSpPr>
+            <a:cxnSpLocks/>
+          </p:cNvCxnSpPr>
           <p:nvPr/>
         </p:nvCxnSpPr>
         <p:spPr>
           <a:xfrm flipV="1">
-            <a:off x="4774494" y="3714697"/>
-            <a:ext cx="0" cy="589989"/>
+            <a:off x="4774494" y="3581400"/>
+            <a:ext cx="0" cy="723287"/>
           </a:xfrm>
           <a:prstGeom prst="straightConnector1">
             <a:avLst/>
@@ -7758,7 +7621,7 @@
         </p:nvCxnSpPr>
         <p:spPr>
           <a:xfrm>
-            <a:off x="5219859" y="3553381"/>
+            <a:off x="5219859" y="3444524"/>
             <a:ext cx="577443" cy="12700"/>
           </a:xfrm>
           <a:prstGeom prst="straightConnector1">
@@ -7796,7 +7659,7 @@
         </p:nvSpPr>
         <p:spPr>
           <a:xfrm>
-            <a:off x="5736059" y="3262147"/>
+            <a:off x="5736059" y="3131518"/>
             <a:ext cx="557573" cy="646331"/>
           </a:xfrm>
           <a:prstGeom prst="rect">
@@ -7811,10 +7674,9 @@
           <a:lstStyle/>
           <a:p>
             <a:r>
-              <a:rPr lang="en-US" sz="3600" b="1" smtClean="0"/>
+              <a:rPr lang="en-US" sz="3600" b="1" dirty="0"/>
               <a:t>∅</a:t>
             </a:r>
-            <a:endParaRPr lang="en-US" sz="3600" b="1"/>
           </a:p>
         </p:txBody>
       </p:sp>
@@ -7847,7 +7709,7 @@
         </p:blipFill>
         <p:spPr>
           <a:xfrm>
-            <a:off x="5767470" y="2627497"/>
+            <a:off x="6115814" y="2322694"/>
             <a:ext cx="1305339" cy="1305339"/>
           </a:xfrm>
           <a:prstGeom prst="rect">
@@ -7863,7 +7725,7 @@
         </p:nvSpPr>
         <p:spPr>
           <a:xfrm>
-            <a:off x="6161624" y="3084904"/>
+            <a:off x="6509968" y="2780101"/>
             <a:ext cx="554960" cy="369332"/>
           </a:xfrm>
           <a:prstGeom prst="rect">
@@ -7878,10 +7740,9 @@
           <a:lstStyle/>
           <a:p>
             <a:r>
-              <a:rPr lang="en-US" smtClean="0"/>
+              <a:rPr lang="en-US"/>
               <a:t>GFP</a:t>
             </a:r>
-            <a:endParaRPr lang="en-US"/>
           </a:p>
         </p:txBody>
       </p:sp>
@@ -7914,7 +7775,7 @@
         </p:blipFill>
         <p:spPr>
           <a:xfrm>
-            <a:off x="3158870" y="2609477"/>
+            <a:off x="3158870" y="2195820"/>
             <a:ext cx="1305339" cy="1305339"/>
           </a:xfrm>
           <a:prstGeom prst="rect">
@@ -7930,7 +7791,7 @@
         </p:nvSpPr>
         <p:spPr>
           <a:xfrm>
-            <a:off x="3531508" y="3045368"/>
+            <a:off x="3531508" y="2631711"/>
             <a:ext cx="592791" cy="369332"/>
           </a:xfrm>
           <a:prstGeom prst="rect">
@@ -7945,7 +7806,7 @@
           <a:lstStyle/>
           <a:p>
             <a:r>
-              <a:rPr lang="en-US" smtClean="0"/>
+              <a:rPr lang="en-US"/>
               <a:t>TetR</a:t>
             </a:r>
             <a:endParaRPr lang="en-US" dirty="0"/>
@@ -7974,28 +7835,24 @@
           <a:lstStyle/>
           <a:p>
             <a:r>
-              <a:rPr lang="en-US" i="1" dirty="0" smtClean="0"/>
+              <a:rPr lang="en-US" i="1" dirty="0"/>
               <a:t>The top functional unit produces the </a:t>
             </a:r>
             <a:r>
-              <a:rPr lang="en-US" i="1" dirty="0" err="1" smtClean="0"/>
+              <a:rPr lang="en-US" i="1" dirty="0" err="1"/>
               <a:t>TetR</a:t>
             </a:r>
             <a:r>
-              <a:rPr lang="en-US" i="1" dirty="0" smtClean="0"/>
+              <a:rPr lang="en-US" i="1" dirty="0"/>
               <a:t> protein constitutively, under control of promoter J23101. </a:t>
             </a:r>
             <a:r>
-              <a:rPr lang="en-US" i="1" dirty="0" err="1" smtClean="0"/>
+              <a:rPr lang="en-US" i="1" dirty="0" err="1"/>
               <a:t>TetR</a:t>
             </a:r>
             <a:r>
-              <a:rPr lang="en-US" i="1" dirty="0" smtClean="0"/>
-              <a:t> represses </a:t>
-            </a:r>
-            <a:r>
               <a:rPr lang="en-US" i="1" dirty="0"/>
-              <a:t>the </a:t>
+              <a:t> represses the </a:t>
             </a:r>
             <a:r>
               <a:rPr lang="en-US" i="1" dirty="0" err="1"/>
@@ -8054,10 +7911,9 @@
           <a:lstStyle/>
           <a:p>
             <a:r>
-              <a:rPr lang="en-US" dirty="0" smtClean="0"/>
+              <a:rPr lang="en-US" dirty="0"/>
               <a:t>Nucleic Acid Glyphs</a:t>
             </a:r>
-            <a:endParaRPr lang="en-US" dirty="0"/>
           </a:p>
         </p:txBody>
       </p:sp>
@@ -8835,10 +8691,9 @@
           <a:p>
             <a:pPr algn="ctr"/>
             <a:r>
-              <a:rPr lang="en-US" sz="1400" dirty="0" smtClean="0"/>
+              <a:rPr lang="en-US" sz="1400" dirty="0"/>
               <a:t>Aptamer</a:t>
             </a:r>
-            <a:endParaRPr lang="en-US" sz="1400" dirty="0"/>
           </a:p>
         </p:txBody>
       </p:sp>
@@ -8866,10 +8721,9 @@
           <a:p>
             <a:pPr algn="ctr"/>
             <a:r>
-              <a:rPr lang="en-US" sz="1400" dirty="0" smtClean="0"/>
+              <a:rPr lang="en-US" sz="1400" dirty="0"/>
               <a:t>CDS</a:t>
             </a:r>
-            <a:endParaRPr lang="en-US" sz="1400" dirty="0"/>
           </a:p>
         </p:txBody>
       </p:sp>
@@ -8897,10 +8751,9 @@
           <a:p>
             <a:pPr algn="ctr"/>
             <a:r>
-              <a:rPr lang="en-US" sz="1400" dirty="0" smtClean="0"/>
+              <a:rPr lang="en-US" sz="1400" dirty="0"/>
               <a:t>Blunt Restriction Site</a:t>
             </a:r>
-            <a:endParaRPr lang="en-US" sz="1400" dirty="0"/>
           </a:p>
         </p:txBody>
       </p:sp>
@@ -8928,10 +8781,9 @@
           <a:p>
             <a:pPr algn="ctr"/>
             <a:r>
-              <a:rPr lang="en-US" sz="1400" dirty="0" smtClean="0"/>
+              <a:rPr lang="en-US" sz="1400" dirty="0"/>
               <a:t>Assembly Scar</a:t>
             </a:r>
-            <a:endParaRPr lang="en-US" sz="1400" dirty="0"/>
           </a:p>
         </p:txBody>
       </p:sp>
@@ -8959,10 +8811,9 @@
           <a:p>
             <a:pPr algn="ctr"/>
             <a:r>
-              <a:rPr lang="en-US" sz="1400" dirty="0" smtClean="0"/>
+              <a:rPr lang="en-US" sz="1400" dirty="0"/>
               <a:t>Composite</a:t>
             </a:r>
-            <a:endParaRPr lang="en-US" sz="1400" dirty="0"/>
           </a:p>
         </p:txBody>
       </p:sp>
@@ -8990,10 +8841,9 @@
           <a:p>
             <a:pPr algn="ctr"/>
             <a:r>
-              <a:rPr lang="en-US" sz="1400" dirty="0" smtClean="0"/>
+              <a:rPr lang="en-US" sz="1400" dirty="0"/>
               <a:t>Engineered Region</a:t>
             </a:r>
-            <a:endParaRPr lang="en-US" sz="1400" dirty="0"/>
           </a:p>
         </p:txBody>
       </p:sp>
@@ -9021,10 +8871,9 @@
           <a:p>
             <a:pPr algn="ctr"/>
             <a:r>
-              <a:rPr lang="en-US" sz="1400" dirty="0" smtClean="0"/>
+              <a:rPr lang="en-US" sz="1400" dirty="0"/>
               <a:t>Sticky Restriction Site</a:t>
             </a:r>
-            <a:endParaRPr lang="en-US" sz="1400" dirty="0"/>
           </a:p>
         </p:txBody>
       </p:sp>
@@ -9052,10 +8901,9 @@
           <a:p>
             <a:pPr algn="ctr"/>
             <a:r>
-              <a:rPr lang="en-US" sz="1400" dirty="0" smtClean="0"/>
+              <a:rPr lang="en-US" sz="1400" dirty="0"/>
               <a:t>Insulator</a:t>
             </a:r>
-            <a:endParaRPr lang="en-US" sz="1400" dirty="0"/>
           </a:p>
         </p:txBody>
       </p:sp>
@@ -9083,10 +8931,9 @@
           <a:p>
             <a:pPr algn="ctr"/>
             <a:r>
-              <a:rPr lang="en-US" sz="1400" dirty="0" smtClean="0"/>
+              <a:rPr lang="en-US" sz="1400" dirty="0"/>
               <a:t>Sticky End</a:t>
             </a:r>
-            <a:endParaRPr lang="en-US" sz="1400" dirty="0"/>
           </a:p>
         </p:txBody>
       </p:sp>
@@ -9114,10 +8961,9 @@
           <a:p>
             <a:pPr algn="ctr"/>
             <a:r>
-              <a:rPr lang="en-US" sz="1400" dirty="0" smtClean="0"/>
+              <a:rPr lang="en-US" sz="1400" dirty="0"/>
               <a:t>No Glyph</a:t>
             </a:r>
-            <a:endParaRPr lang="en-US" sz="1400" dirty="0"/>
           </a:p>
         </p:txBody>
       </p:sp>
@@ -9145,10 +8991,9 @@
           <a:p>
             <a:pPr algn="ctr"/>
             <a:r>
-              <a:rPr lang="en-US" sz="1400" dirty="0" smtClean="0"/>
+              <a:rPr lang="en-US" sz="1400" dirty="0"/>
               <a:t>Non-Coding RNA</a:t>
             </a:r>
-            <a:endParaRPr lang="en-US" sz="1400" dirty="0"/>
           </a:p>
         </p:txBody>
       </p:sp>
@@ -9176,10 +9021,9 @@
           <a:p>
             <a:pPr algn="ctr"/>
             <a:r>
-              <a:rPr lang="en-US" sz="1400" dirty="0" smtClean="0"/>
+              <a:rPr lang="en-US" sz="1400" dirty="0"/>
               <a:t>ORI</a:t>
             </a:r>
-            <a:endParaRPr lang="en-US" sz="1400" dirty="0"/>
           </a:p>
         </p:txBody>
       </p:sp>
@@ -9207,10 +9051,9 @@
           <a:p>
             <a:pPr algn="ctr"/>
             <a:r>
-              <a:rPr lang="en-US" sz="1400" dirty="0" smtClean="0"/>
+              <a:rPr lang="en-US" sz="1400" dirty="0"/>
               <a:t>Operator</a:t>
             </a:r>
-            <a:endParaRPr lang="en-US" sz="1400" dirty="0"/>
           </a:p>
         </p:txBody>
       </p:sp>
@@ -9238,10 +9081,9 @@
           <a:p>
             <a:pPr algn="ctr"/>
             <a:r>
-              <a:rPr lang="en-US" sz="1400" dirty="0" smtClean="0"/>
+              <a:rPr lang="en-US" sz="1400" dirty="0"/>
               <a:t>Omitted Detail</a:t>
             </a:r>
-            <a:endParaRPr lang="en-US" sz="1400" dirty="0"/>
           </a:p>
         </p:txBody>
       </p:sp>
@@ -9269,10 +9111,9 @@
           <a:p>
             <a:pPr algn="ctr"/>
             <a:r>
-              <a:rPr lang="en-US" sz="1400" dirty="0" smtClean="0"/>
+              <a:rPr lang="en-US" sz="1400" dirty="0"/>
               <a:t>Poly-A Site</a:t>
             </a:r>
-            <a:endParaRPr lang="en-US" sz="1400" dirty="0"/>
           </a:p>
         </p:txBody>
       </p:sp>
@@ -9300,10 +9141,9 @@
           <a:p>
             <a:pPr algn="ctr"/>
             <a:r>
-              <a:rPr lang="en-US" sz="1400" dirty="0" smtClean="0"/>
+              <a:rPr lang="en-US" sz="1400" dirty="0"/>
               <a:t>Primer Binding Site</a:t>
             </a:r>
-            <a:endParaRPr lang="en-US" sz="1400" dirty="0"/>
           </a:p>
         </p:txBody>
       </p:sp>
@@ -9331,10 +9171,9 @@
           <a:p>
             <a:pPr algn="ctr"/>
             <a:r>
-              <a:rPr lang="en-US" sz="1400" dirty="0" smtClean="0"/>
+              <a:rPr lang="en-US" sz="1400" dirty="0"/>
               <a:t>Signature</a:t>
             </a:r>
-            <a:endParaRPr lang="en-US" sz="1400" dirty="0"/>
           </a:p>
         </p:txBody>
       </p:sp>
@@ -9362,10 +9201,9 @@
           <a:p>
             <a:pPr algn="ctr"/>
             <a:r>
-              <a:rPr lang="en-US" sz="1400" dirty="0" smtClean="0"/>
+              <a:rPr lang="en-US" sz="1400" dirty="0"/>
               <a:t>Ribosome Entry Site</a:t>
             </a:r>
-            <a:endParaRPr lang="en-US" sz="1400" dirty="0"/>
           </a:p>
         </p:txBody>
       </p:sp>
@@ -9393,10 +9231,9 @@
           <a:p>
             <a:pPr algn="ctr"/>
             <a:r>
-              <a:rPr lang="en-US" sz="1400" dirty="0" smtClean="0"/>
+              <a:rPr lang="en-US" sz="1400" dirty="0"/>
               <a:t>Promoter</a:t>
             </a:r>
-            <a:endParaRPr lang="en-US" sz="1400" dirty="0"/>
           </a:p>
         </p:txBody>
       </p:sp>
@@ -9424,10 +9261,9 @@
           <a:p>
             <a:pPr algn="ctr"/>
             <a:r>
-              <a:rPr lang="en-US" sz="1400" dirty="0" smtClean="0"/>
+              <a:rPr lang="en-US" sz="1400" dirty="0"/>
               <a:t>Terminator</a:t>
             </a:r>
-            <a:endParaRPr lang="en-US" sz="1400" dirty="0"/>
           </a:p>
         </p:txBody>
       </p:sp>
@@ -9455,10 +9291,9 @@
           <a:p>
             <a:pPr algn="ctr"/>
             <a:r>
-              <a:rPr lang="en-US" sz="1400" dirty="0" smtClean="0"/>
+              <a:rPr lang="en-US" sz="1400" dirty="0"/>
               <a:t>ORI-T</a:t>
             </a:r>
-            <a:endParaRPr lang="en-US" sz="1400" dirty="0"/>
           </a:p>
         </p:txBody>
       </p:sp>
@@ -9486,10 +9321,9 @@
           <a:p>
             <a:pPr algn="ctr"/>
             <a:r>
-              <a:rPr lang="en-US" sz="1400" dirty="0" smtClean="0"/>
+              <a:rPr lang="en-US" sz="1400" dirty="0"/>
               <a:t>Recombination Site</a:t>
             </a:r>
-            <a:endParaRPr lang="en-US" sz="1400" dirty="0"/>
           </a:p>
         </p:txBody>
       </p:sp>
@@ -9517,13 +9351,8 @@
           <a:p>
             <a:r>
               <a:rPr lang="en-US" sz="1100" i="1" dirty="0"/>
-              <a:t>r</a:t>
-            </a:r>
-            <a:r>
-              <a:rPr lang="en-US" sz="1100" i="1" dirty="0" smtClean="0"/>
-              <a:t>ecommended       alternate  </a:t>
-            </a:r>
-            <a:endParaRPr lang="en-US" sz="1100" i="1" dirty="0"/>
+              <a:t>recommended       alternate  </a:t>
+            </a:r>
           </a:p>
         </p:txBody>
       </p:sp>
@@ -9573,10 +9402,9 @@
           <a:lstStyle/>
           <a:p>
             <a:r>
-              <a:rPr lang="en-US" dirty="0" smtClean="0"/>
+              <a:rPr lang="en-US" dirty="0"/>
               <a:t>Nucleic Acid Glyphs</a:t>
             </a:r>
-            <a:endParaRPr lang="en-US" dirty="0"/>
           </a:p>
         </p:txBody>
       </p:sp>
@@ -9964,10 +9792,9 @@
           <a:p>
             <a:pPr algn="ctr"/>
             <a:r>
-              <a:rPr lang="en-US" sz="1400" dirty="0" smtClean="0"/>
+              <a:rPr lang="en-US" sz="1400" dirty="0"/>
               <a:t>Unspecified</a:t>
             </a:r>
-            <a:endParaRPr lang="en-US" sz="1400" dirty="0"/>
           </a:p>
         </p:txBody>
       </p:sp>
@@ -9995,10 +9822,9 @@
           <a:p>
             <a:pPr algn="ctr"/>
             <a:r>
-              <a:rPr lang="en-US" sz="1400" dirty="0" smtClean="0"/>
+              <a:rPr lang="en-US" sz="1400" dirty="0"/>
               <a:t>Stability Element</a:t>
             </a:r>
-            <a:endParaRPr lang="en-US" sz="1400" dirty="0"/>
           </a:p>
         </p:txBody>
       </p:sp>
@@ -10026,10 +9852,9 @@
           <a:p>
             <a:pPr algn="ctr"/>
             <a:r>
-              <a:rPr lang="en-US" sz="1400" dirty="0" smtClean="0"/>
+              <a:rPr lang="en-US" sz="1400" dirty="0"/>
               <a:t>Cleavage Site</a:t>
             </a:r>
-            <a:endParaRPr lang="en-US" sz="1400" dirty="0"/>
           </a:p>
         </p:txBody>
       </p:sp>
@@ -10057,10 +9882,9 @@
           <a:p>
             <a:pPr algn="ctr"/>
             <a:r>
-              <a:rPr lang="en-US" sz="1400" dirty="0" smtClean="0"/>
+              <a:rPr lang="en-US" sz="1400" dirty="0"/>
               <a:t>Location (recommended)</a:t>
             </a:r>
-            <a:endParaRPr lang="en-US" sz="1400" dirty="0"/>
           </a:p>
         </p:txBody>
       </p:sp>
@@ -10148,13 +9972,8 @@
           <a:p>
             <a:r>
               <a:rPr lang="en-US" sz="1100" i="1" dirty="0"/>
-              <a:t>r</a:t>
-            </a:r>
-            <a:r>
-              <a:rPr lang="en-US" sz="1100" i="1" dirty="0" smtClean="0"/>
-              <a:t>ecommended       alternate  </a:t>
-            </a:r>
-            <a:endParaRPr lang="en-US" sz="1100" i="1" dirty="0"/>
+              <a:t>recommended       alternate  </a:t>
+            </a:r>
           </a:p>
         </p:txBody>
       </p:sp>
@@ -10182,10 +10001,9 @@
           <a:p>
             <a:pPr algn="ctr"/>
             <a:r>
-              <a:rPr lang="en-US" sz="1400" dirty="0" smtClean="0"/>
+              <a:rPr lang="en-US" sz="1400" dirty="0"/>
               <a:t>Location (alternate)</a:t>
             </a:r>
-            <a:endParaRPr lang="en-US" sz="1400" dirty="0"/>
           </a:p>
         </p:txBody>
       </p:sp>
@@ -10227,10 +10045,9 @@
             <a:p>
               <a:pPr algn="ctr"/>
               <a:r>
-                <a:rPr lang="en-US" sz="1100" i="1" dirty="0" smtClean="0"/>
+                <a:rPr lang="en-US" sz="1100" i="1" dirty="0"/>
                 <a:t>DNA</a:t>
               </a:r>
-              <a:endParaRPr lang="en-US" sz="1100" i="1" dirty="0"/>
             </a:p>
           </p:txBody>
         </p:sp>
@@ -10259,11 +10076,7 @@
               <a:pPr algn="ctr"/>
               <a:r>
                 <a:rPr lang="en-US" sz="1100" i="1"/>
-                <a:t>R</a:t>
-              </a:r>
-              <a:r>
-                <a:rPr lang="en-US" sz="1100" i="1" smtClean="0"/>
-                <a:t>NA</a:t>
+                <a:t>RNA</a:t>
               </a:r>
               <a:endParaRPr lang="en-US" sz="1100" i="1" dirty="0"/>
             </a:p>
@@ -10294,13 +10107,8 @@
               <a:pPr algn="ctr"/>
               <a:r>
                 <a:rPr lang="en-US" sz="1100" i="1" dirty="0"/>
-                <a:t>P</a:t>
+                <a:t>Protein</a:t>
               </a:r>
-              <a:r>
-                <a:rPr lang="en-US" sz="1100" i="1" dirty="0" smtClean="0"/>
-                <a:t>rotein</a:t>
-              </a:r>
-              <a:endParaRPr lang="en-US" sz="1100" i="1" dirty="0"/>
             </a:p>
           </p:txBody>
         </p:sp>
@@ -10343,10 +10151,9 @@
             <a:p>
               <a:pPr algn="ctr"/>
               <a:r>
-                <a:rPr lang="en-US" sz="1100" i="1" dirty="0" smtClean="0"/>
+                <a:rPr lang="en-US" sz="1100" i="1" dirty="0"/>
                 <a:t>DNA</a:t>
               </a:r>
-              <a:endParaRPr lang="en-US" sz="1100" i="1" dirty="0"/>
             </a:p>
           </p:txBody>
         </p:sp>
@@ -10375,11 +10182,7 @@
               <a:pPr algn="ctr"/>
               <a:r>
                 <a:rPr lang="en-US" sz="1100" i="1"/>
-                <a:t>R</a:t>
-              </a:r>
-              <a:r>
-                <a:rPr lang="en-US" sz="1100" i="1" smtClean="0"/>
-                <a:t>NA</a:t>
+                <a:t>RNA</a:t>
               </a:r>
               <a:endParaRPr lang="en-US" sz="1100" i="1" dirty="0"/>
             </a:p>
@@ -10410,13 +10213,8 @@
               <a:pPr algn="ctr"/>
               <a:r>
                 <a:rPr lang="en-US" sz="1100" i="1" dirty="0"/>
-                <a:t>P</a:t>
+                <a:t>Protein</a:t>
               </a:r>
-              <a:r>
-                <a:rPr lang="en-US" sz="1100" i="1" dirty="0" smtClean="0"/>
-                <a:t>rotein</a:t>
-              </a:r>
-              <a:endParaRPr lang="en-US" sz="1100" i="1" dirty="0"/>
             </a:p>
           </p:txBody>
         </p:sp>
@@ -10459,10 +10257,9 @@
             <a:p>
               <a:pPr algn="ctr"/>
               <a:r>
-                <a:rPr lang="en-US" sz="1100" i="1" dirty="0" smtClean="0"/>
+                <a:rPr lang="en-US" sz="1100" i="1" dirty="0"/>
                 <a:t>DNA</a:t>
               </a:r>
-              <a:endParaRPr lang="en-US" sz="1100" i="1" dirty="0"/>
             </a:p>
           </p:txBody>
         </p:sp>
@@ -10491,11 +10288,7 @@
               <a:pPr algn="ctr"/>
               <a:r>
                 <a:rPr lang="en-US" sz="1100" i="1"/>
-                <a:t>R</a:t>
-              </a:r>
-              <a:r>
-                <a:rPr lang="en-US" sz="1100" i="1" smtClean="0"/>
-                <a:t>NA</a:t>
+                <a:t>RNA</a:t>
               </a:r>
               <a:endParaRPr lang="en-US" sz="1100" i="1" dirty="0"/>
             </a:p>
@@ -10526,13 +10319,8 @@
               <a:pPr algn="ctr"/>
               <a:r>
                 <a:rPr lang="en-US" sz="1100" i="1" dirty="0"/>
-                <a:t>P</a:t>
+                <a:t>Protein</a:t>
               </a:r>
-              <a:r>
-                <a:rPr lang="en-US" sz="1100" i="1" dirty="0" smtClean="0"/>
-                <a:t>rotein</a:t>
-              </a:r>
-              <a:endParaRPr lang="en-US" sz="1100" i="1" dirty="0"/>
             </a:p>
           </p:txBody>
         </p:sp>
@@ -10575,10 +10363,9 @@
             <a:p>
               <a:pPr algn="ctr"/>
               <a:r>
-                <a:rPr lang="en-US" sz="1100" i="1" dirty="0" smtClean="0"/>
+                <a:rPr lang="en-US" sz="1100" i="1" dirty="0"/>
                 <a:t>DNA</a:t>
               </a:r>
-              <a:endParaRPr lang="en-US" sz="1100" i="1" dirty="0"/>
             </a:p>
           </p:txBody>
         </p:sp>
@@ -10607,11 +10394,7 @@
               <a:pPr algn="ctr"/>
               <a:r>
                 <a:rPr lang="en-US" sz="1100" i="1"/>
-                <a:t>R</a:t>
-              </a:r>
-              <a:r>
-                <a:rPr lang="en-US" sz="1100" i="1" smtClean="0"/>
-                <a:t>NA</a:t>
+                <a:t>RNA</a:t>
               </a:r>
               <a:endParaRPr lang="en-US" sz="1100" i="1" dirty="0"/>
             </a:p>
@@ -10642,13 +10425,8 @@
               <a:pPr algn="ctr"/>
               <a:r>
                 <a:rPr lang="en-US" sz="1100" i="1" dirty="0"/>
-                <a:t>P</a:t>
+                <a:t>Protein</a:t>
               </a:r>
-              <a:r>
-                <a:rPr lang="en-US" sz="1100" i="1" dirty="0" smtClean="0"/>
-                <a:t>rotein</a:t>
-              </a:r>
-              <a:endParaRPr lang="en-US" sz="1100" i="1" dirty="0"/>
             </a:p>
           </p:txBody>
         </p:sp>
@@ -10704,11 +10482,11 @@
           <a:lstStyle/>
           <a:p>
             <a:r>
-              <a:rPr lang="en-US" dirty="0" smtClean="0"/>
+              <a:rPr lang="en-US" dirty="0"/>
               <a:t>Molecular Species </a:t>
             </a:r>
             <a:r>
-              <a:rPr lang="en-US" smtClean="0"/>
+              <a:rPr lang="en-US"/>
               <a:t>&amp; Interaction Glyphs</a:t>
             </a:r>
             <a:endParaRPr lang="en-US" dirty="0"/>
@@ -11069,10 +10847,9 @@
           <a:p>
             <a:pPr algn="ctr"/>
             <a:r>
-              <a:rPr lang="en-US" sz="1400" dirty="0" smtClean="0"/>
+              <a:rPr lang="en-US" sz="1400" dirty="0"/>
               <a:t>Complex</a:t>
             </a:r>
-            <a:endParaRPr lang="en-US" sz="1400" dirty="0"/>
           </a:p>
         </p:txBody>
       </p:sp>
@@ -11100,10 +10877,9 @@
           <a:p>
             <a:pPr algn="ctr"/>
             <a:r>
-              <a:rPr lang="en-US" sz="1400" dirty="0" smtClean="0"/>
+              <a:rPr lang="en-US" sz="1400" dirty="0"/>
               <a:t>Small Molecule</a:t>
             </a:r>
-            <a:endParaRPr lang="en-US" sz="1400" dirty="0"/>
           </a:p>
         </p:txBody>
       </p:sp>
@@ -11205,10 +10981,9 @@
             <a:p>
               <a:pPr algn="ctr"/>
               <a:r>
-                <a:rPr lang="en-US" sz="1400" dirty="0" smtClean="0"/>
+                <a:rPr lang="en-US" sz="1400" dirty="0"/>
                 <a:t>Macromolecule</a:t>
               </a:r>
-              <a:endParaRPr lang="en-US" sz="1400" dirty="0"/>
             </a:p>
           </p:txBody>
         </p:sp>
@@ -11237,10 +11012,9 @@
           <a:p>
             <a:pPr algn="ctr"/>
             <a:r>
-              <a:rPr lang="en-US" sz="1400" dirty="0" smtClean="0"/>
+              <a:rPr lang="en-US" sz="1400" dirty="0"/>
               <a:t>Nucleic Acid (Generic)</a:t>
             </a:r>
-            <a:endParaRPr lang="en-US" sz="1400" dirty="0"/>
           </a:p>
         </p:txBody>
       </p:sp>
@@ -11268,10 +11042,9 @@
           <a:p>
             <a:pPr algn="ctr"/>
             <a:r>
-              <a:rPr lang="en-US" sz="1400" dirty="0" smtClean="0"/>
+              <a:rPr lang="en-US" sz="1400" dirty="0"/>
               <a:t>Unspecified</a:t>
             </a:r>
-            <a:endParaRPr lang="en-US" sz="1400" dirty="0"/>
           </a:p>
         </p:txBody>
       </p:sp>
@@ -11299,10 +11072,9 @@
           <a:p>
             <a:pPr algn="ctr"/>
             <a:r>
-              <a:rPr lang="en-US" sz="1400" dirty="0" smtClean="0"/>
+              <a:rPr lang="en-US" sz="1400" dirty="0"/>
               <a:t>Nucleic Acid (2-Strand)</a:t>
             </a:r>
-            <a:endParaRPr lang="en-US" sz="1400" dirty="0"/>
           </a:p>
         </p:txBody>
       </p:sp>
@@ -11330,10 +11102,9 @@
           <a:p>
             <a:pPr algn="ctr"/>
             <a:r>
-              <a:rPr lang="en-US" sz="1400" dirty="0" smtClean="0"/>
+              <a:rPr lang="en-US" sz="1400" dirty="0"/>
               <a:t>Nucleic Acid (1-Strand)</a:t>
             </a:r>
-            <a:endParaRPr lang="en-US" sz="1400" dirty="0"/>
           </a:p>
         </p:txBody>
       </p:sp>
@@ -11361,10 +11132,9 @@
           <a:p>
             <a:pPr algn="ctr"/>
             <a:r>
-              <a:rPr lang="en-US" sz="1400" dirty="0" smtClean="0"/>
+              <a:rPr lang="en-US" sz="1400" dirty="0"/>
               <a:t>No Glyph</a:t>
             </a:r>
-            <a:endParaRPr lang="en-US" sz="1400" dirty="0"/>
           </a:p>
         </p:txBody>
       </p:sp>
@@ -11392,13 +11162,8 @@
           <a:p>
             <a:r>
               <a:rPr lang="en-US" sz="1100" i="1" dirty="0"/>
-              <a:t>s</a:t>
-            </a:r>
-            <a:r>
-              <a:rPr lang="en-US" sz="1100" i="1" dirty="0" smtClean="0"/>
-              <a:t>uperpose glyphs</a:t>
-            </a:r>
-            <a:endParaRPr lang="en-US" sz="1100" i="1" dirty="0"/>
+              <a:t>superpose glyphs</a:t>
+            </a:r>
           </a:p>
         </p:txBody>
       </p:sp>
@@ -11425,10 +11190,9 @@
           <a:lstStyle/>
           <a:p>
             <a:r>
-              <a:rPr lang="en-US" b="1" u="sng" dirty="0" smtClean="0"/>
+              <a:rPr lang="en-US" b="1" u="sng" dirty="0"/>
               <a:t>Molecular Species</a:t>
             </a:r>
-            <a:endParaRPr lang="en-US" b="1" u="sng" dirty="0"/>
           </a:p>
         </p:txBody>
       </p:sp>
@@ -11455,10 +11219,9 @@
           <a:lstStyle/>
           <a:p>
             <a:r>
-              <a:rPr lang="en-US" b="1" u="sng" dirty="0" smtClean="0"/>
+              <a:rPr lang="en-US" b="1" u="sng" dirty="0"/>
               <a:t>Interaction</a:t>
             </a:r>
-            <a:endParaRPr lang="en-US" b="1" u="sng" dirty="0"/>
           </a:p>
         </p:txBody>
       </p:sp>
@@ -11636,10 +11399,9 @@
           <a:p>
             <a:pPr algn="ctr"/>
             <a:r>
-              <a:rPr lang="en-US" sz="1400" dirty="0" smtClean="0"/>
+              <a:rPr lang="en-US" sz="1400" dirty="0"/>
               <a:t>Control</a:t>
             </a:r>
-            <a:endParaRPr lang="en-US" sz="1400" dirty="0"/>
           </a:p>
         </p:txBody>
       </p:sp>
@@ -11667,10 +11429,9 @@
           <a:p>
             <a:pPr algn="ctr"/>
             <a:r>
-              <a:rPr lang="en-US" sz="1400" dirty="0" smtClean="0"/>
+              <a:rPr lang="en-US" sz="1400" dirty="0"/>
               <a:t>Process</a:t>
             </a:r>
-            <a:endParaRPr lang="en-US" sz="1400" dirty="0"/>
           </a:p>
         </p:txBody>
       </p:sp>
@@ -11698,10 +11459,9 @@
           <a:p>
             <a:pPr algn="ctr"/>
             <a:r>
-              <a:rPr lang="en-US" sz="1400" dirty="0" smtClean="0"/>
+              <a:rPr lang="en-US" sz="1400" dirty="0"/>
               <a:t>Inhibition</a:t>
             </a:r>
-            <a:endParaRPr lang="en-US" sz="1400" dirty="0"/>
           </a:p>
         </p:txBody>
       </p:sp>
@@ -11729,10 +11489,9 @@
           <a:p>
             <a:pPr algn="ctr"/>
             <a:r>
-              <a:rPr lang="en-US" sz="1400" dirty="0" smtClean="0"/>
+              <a:rPr lang="en-US" sz="1400" dirty="0"/>
               <a:t>Degradation</a:t>
             </a:r>
-            <a:endParaRPr lang="en-US" sz="1400" dirty="0"/>
           </a:p>
         </p:txBody>
       </p:sp>
@@ -11760,10 +11519,9 @@
           <a:p>
             <a:pPr algn="ctr"/>
             <a:r>
-              <a:rPr lang="en-US" sz="1400" dirty="0" smtClean="0"/>
+              <a:rPr lang="en-US" sz="1400" dirty="0"/>
               <a:t>Stimulation</a:t>
             </a:r>
-            <a:endParaRPr lang="en-US" sz="1400" dirty="0"/>
           </a:p>
         </p:txBody>
       </p:sp>
@@ -11791,13 +11549,8 @@
           <a:p>
             <a:r>
               <a:rPr lang="en-US" sz="1100" i="1" dirty="0"/>
-              <a:t>r</a:t>
-            </a:r>
-            <a:r>
-              <a:rPr lang="en-US" sz="1100" i="1" dirty="0" smtClean="0"/>
-              <a:t>ecommended       alternate  </a:t>
-            </a:r>
-            <a:endParaRPr lang="en-US" sz="1100" i="1" dirty="0"/>
+              <a:t>recommended       alternate  </a:t>
+            </a:r>
           </a:p>
         </p:txBody>
       </p:sp>
@@ -11825,13 +11578,8 @@
           <a:p>
             <a:r>
               <a:rPr lang="en-US" sz="1100" i="1" dirty="0"/>
-              <a:t>r</a:t>
-            </a:r>
-            <a:r>
-              <a:rPr lang="en-US" sz="1100" i="1" dirty="0" smtClean="0"/>
-              <a:t>ecommended       alternate  </a:t>
-            </a:r>
-            <a:endParaRPr lang="en-US" sz="1100" i="1" dirty="0"/>
+              <a:t>recommended       alternate  </a:t>
+            </a:r>
           </a:p>
         </p:txBody>
       </p:sp>
@@ -11911,13 +11659,8 @@
           <a:p>
             <a:r>
               <a:rPr lang="en-US" dirty="0"/>
-              <a:t>M</a:t>
-            </a:r>
-            <a:r>
-              <a:rPr lang="en-US" dirty="0" smtClean="0"/>
-              <a:t>aking SBOL Visual Diagrams</a:t>
-            </a:r>
-            <a:endParaRPr lang="en-US" dirty="0"/>
+              <a:t>Making SBOL Visual Diagrams</a:t>
+            </a:r>
           </a:p>
         </p:txBody>
       </p:sp>
@@ -11937,47 +11680,40 @@
           <a:lstStyle/>
           <a:p>
             <a:r>
-              <a:rPr lang="en-US" dirty="0" smtClean="0"/>
+              <a:rPr lang="en-US" dirty="0"/>
               <a:t>Using your favorite graphics editor:</a:t>
             </a:r>
           </a:p>
           <a:p>
             <a:pPr lvl="1"/>
             <a:r>
-              <a:rPr lang="en-US" dirty="0" smtClean="0"/>
+              <a:rPr lang="en-US" dirty="0"/>
               <a:t>Many glyphs can be drawn directly</a:t>
             </a:r>
           </a:p>
           <a:p>
             <a:pPr lvl="1"/>
             <a:r>
-              <a:rPr lang="en-US" dirty="0" smtClean="0"/>
+              <a:rPr lang="en-US" dirty="0"/>
               <a:t>Glyph set available: </a:t>
             </a:r>
             <a:r>
               <a:rPr lang="en-US" dirty="0">
                 <a:hlinkClick r:id="rId2"/>
               </a:rPr>
-              <a:t>http://sbolstandard.org/visual</a:t>
-            </a:r>
-            <a:r>
-              <a:rPr lang="en-US" dirty="0" smtClean="0">
-                <a:hlinkClick r:id="rId2"/>
-              </a:rPr>
-              <a:t>/</a:t>
-            </a:r>
-            <a:r>
-              <a:rPr lang="en-US" dirty="0" smtClean="0"/>
+              <a:t>http://sbolstandard.org/visual/</a:t>
+            </a:r>
+            <a:r>
+              <a:rPr lang="en-US" dirty="0"/>
               <a:t> </a:t>
             </a:r>
+          </a:p>
+          <a:p>
             <a:endParaRPr lang="en-US" dirty="0"/>
           </a:p>
           <a:p>
-            <a:endParaRPr lang="en-US" dirty="0" smtClean="0"/>
-          </a:p>
-          <a:p>
-            <a:r>
-              <a:rPr lang="en-US" dirty="0" smtClean="0"/>
+            <a:r>
+              <a:rPr lang="en-US" dirty="0"/>
               <a:t>Specialized visualization tools:</a:t>
             </a:r>
           </a:p>
@@ -11991,51 +11727,35 @@
               <a:rPr lang="en-US" dirty="0">
                 <a:hlinkClick r:id="rId3"/>
               </a:rPr>
-              <a:t>http://pigeoncad.org</a:t>
-            </a:r>
-            <a:r>
-              <a:rPr lang="en-US" dirty="0" smtClean="0">
-                <a:hlinkClick r:id="rId3"/>
-              </a:rPr>
-              <a:t>/</a:t>
-            </a:r>
-            <a:r>
-              <a:rPr lang="en-US" dirty="0" smtClean="0"/>
-              <a:t> </a:t>
-            </a:r>
-          </a:p>
-          <a:p>
-            <a:pPr lvl="1"/>
-            <a:r>
-              <a:rPr lang="en-US" dirty="0" err="1" smtClean="0"/>
-              <a:t>VisBOL</a:t>
-            </a:r>
-            <a:r>
-              <a:rPr lang="en-US" dirty="0" smtClean="0"/>
-              <a:t>:</a:t>
+              <a:t>http://pigeoncad.org/</a:t>
             </a:r>
             <a:r>
               <a:rPr lang="en-US" dirty="0"/>
               <a:t> </a:t>
             </a:r>
-            <a:r>
-              <a:rPr lang="en-US" dirty="0" smtClean="0">
-                <a:hlinkClick r:id="rId4"/>
-              </a:rPr>
-              <a:t>http</a:t>
+          </a:p>
+          <a:p>
+            <a:pPr lvl="1"/>
+            <a:r>
+              <a:rPr lang="en-US" dirty="0" err="1"/>
+              <a:t>VisBOL</a:t>
+            </a:r>
+            <a:r>
+              <a:rPr lang="en-US" dirty="0"/>
+              <a:t>: </a:t>
             </a:r>
             <a:r>
               <a:rPr lang="en-US" dirty="0">
                 <a:hlinkClick r:id="rId4"/>
               </a:rPr>
-              <a:t>://visbol.org/design/</a:t>
-            </a:r>
-            <a:endParaRPr lang="en-US" dirty="0" smtClean="0"/>
+              <a:t>http://visbol.org/design/</a:t>
+            </a:r>
+            <a:endParaRPr lang="en-US" dirty="0"/>
           </a:p>
           <a:p>
             <a:pPr lvl="1"/>
             <a:r>
-              <a:rPr lang="en-US" dirty="0" err="1" smtClean="0"/>
+              <a:rPr lang="en-US" dirty="0" err="1"/>
               <a:t>GraphViz</a:t>
             </a:r>
             <a:r>
@@ -12046,23 +11766,17 @@
               <a:rPr lang="en-US" dirty="0">
                 <a:hlinkClick r:id="rId5"/>
               </a:rPr>
-              <a:t>http://www.graphviz.org</a:t>
-            </a:r>
-            <a:r>
-              <a:rPr lang="en-US" dirty="0" smtClean="0">
-                <a:hlinkClick r:id="rId5"/>
-              </a:rPr>
-              <a:t>/</a:t>
-            </a:r>
-            <a:r>
-              <a:rPr lang="en-US" dirty="0" smtClean="0"/>
+              <a:t>http://www.graphviz.org/</a:t>
+            </a:r>
+            <a:r>
+              <a:rPr lang="en-US" dirty="0"/>
               <a:t> </a:t>
             </a:r>
           </a:p>
           <a:p>
             <a:pPr lvl="1"/>
             <a:r>
-              <a:rPr lang="en-US" dirty="0" err="1" smtClean="0"/>
+              <a:rPr lang="en-US" dirty="0" err="1"/>
               <a:t>DNAPlotLib</a:t>
             </a:r>
             <a:r>
@@ -12073,16 +11787,10 @@
               <a:rPr lang="en-US" dirty="0">
                 <a:hlinkClick r:id="rId6"/>
               </a:rPr>
-              <a:t>https://github.com/VoigtLab/</a:t>
-            </a:r>
-            <a:r>
-              <a:rPr lang="en-US" dirty="0" smtClean="0">
-                <a:hlinkClick r:id="rId6"/>
-              </a:rPr>
-              <a:t>dnaplotlib</a:t>
-            </a:r>
-            <a:r>
-              <a:rPr lang="en-US" dirty="0" smtClean="0"/>
+              <a:t>https://github.com/VoigtLab/dnaplotlib</a:t>
+            </a:r>
+            <a:r>
+              <a:rPr lang="en-US" dirty="0"/>
               <a:t> </a:t>
             </a:r>
           </a:p>
@@ -12291,13 +11999,6 @@
   <p:clrMapOvr>
     <a:masterClrMapping/>
   </p:clrMapOvr>
-  <p:timing>
-    <p:tnLst>
-      <p:par>
-        <p:cTn id="1" dur="indefinite" restart="never" nodeType="tmRoot"/>
-      </p:par>
-    </p:tnLst>
-  </p:timing>
 </p:sld>
 </file>
 

</xml_diff>